<commit_message>
added tableau images to the notebook
</commit_message>
<xml_diff>
--- a/presentation_Slide/Avionics Safety Report.pptx
+++ b/presentation_Slide/Avionics Safety Report.pptx
@@ -24964,12 +24964,12 @@
           <a:p>
             <a:pPr algn="ctr"/>
             <a:r>
-              <a:rPr lang="en-US" dirty="0"/>
+              <a:rPr lang="en-US" b="0" dirty="0"/>
               <a:t>Post avionics department setup, our responsibility shifts to lives or goods, impacting future fiscal outcomes.</a:t>
             </a:r>
           </a:p>
           <a:p>
-            <a:endParaRPr lang="en-US" dirty="0"/>
+            <a:endParaRPr lang="en-US" b="0" dirty="0"/>
           </a:p>
         </p:txBody>
       </p:sp>
@@ -27168,15 +27168,6 @@
 </file>
 
 <file path=customXml/item1.xml><?xml version="1.0" encoding="utf-8"?>
-<?mso-contentType ?>
-<FormTemplates xmlns="http://schemas.microsoft.com/sharepoint/v3/contenttype/forms">
-  <Display>DocumentLibraryForm</Display>
-  <Edit>DocumentLibraryForm</Edit>
-  <New>DocumentLibraryForm</New>
-</FormTemplates>
-</file>
-
-<file path=customXml/item2.xml><?xml version="1.0" encoding="utf-8"?>
 <p:properties xmlns:p="http://schemas.microsoft.com/office/2006/metadata/properties" xmlns:xsi="http://www.w3.org/2001/XMLSchema-instance" xmlns:pc="http://schemas.microsoft.com/office/infopath/2007/PartnerControls">
   <documentManagement>
     <_ip_UnifiedCompliancePolicyUIAction xmlns="http://schemas.microsoft.com/sharepoint/v3" xsi:nil="true"/>
@@ -27194,6 +27185,15 @@
     <MediaServiceKeyPoints xmlns="71af3243-3dd4-4a8d-8c0d-dd76da1f02a5" xsi:nil="true"/>
   </documentManagement>
 </p:properties>
+</file>
+
+<file path=customXml/item2.xml><?xml version="1.0" encoding="utf-8"?>
+<?mso-contentType ?>
+<FormTemplates xmlns="http://schemas.microsoft.com/sharepoint/v3/contenttype/forms">
+  <Display>DocumentLibraryForm</Display>
+  <Edit>DocumentLibraryForm</Edit>
+  <New>DocumentLibraryForm</New>
+</FormTemplates>
 </file>
 
 <file path=customXml/item3.xml><?xml version="1.0" encoding="utf-8"?>
@@ -27509,14 +27509,6 @@
 </file>
 
 <file path=customXml/itemProps1.xml><?xml version="1.0" encoding="utf-8"?>
-<ds:datastoreItem xmlns:ds="http://schemas.openxmlformats.org/officeDocument/2006/customXml" ds:itemID="{45515263-A3DE-4193-B6AA-5C449C94519F}">
-  <ds:schemaRefs>
-    <ds:schemaRef ds:uri="http://schemas.microsoft.com/sharepoint/v3/contenttype/forms"/>
-  </ds:schemaRefs>
-</ds:datastoreItem>
-</file>
-
-<file path=customXml/itemProps2.xml><?xml version="1.0" encoding="utf-8"?>
 <ds:datastoreItem xmlns:ds="http://schemas.openxmlformats.org/officeDocument/2006/customXml" ds:itemID="{A0AD9BE2-6B3D-4616-B044-300A8177DEA5}">
   <ds:schemaRefs>
     <ds:schemaRef ds:uri="http://schemas.microsoft.com/office/2006/metadata/properties"/>
@@ -27524,6 +27516,14 @@
     <ds:schemaRef ds:uri="http://schemas.microsoft.com/sharepoint/v3"/>
     <ds:schemaRef ds:uri="71af3243-3dd4-4a8d-8c0d-dd76da1f02a5"/>
     <ds:schemaRef ds:uri="230e9df3-be65-4c73-a93b-d1236ebd677e"/>
+  </ds:schemaRefs>
+</ds:datastoreItem>
+</file>
+
+<file path=customXml/itemProps2.xml><?xml version="1.0" encoding="utf-8"?>
+<ds:datastoreItem xmlns:ds="http://schemas.openxmlformats.org/officeDocument/2006/customXml" ds:itemID="{45515263-A3DE-4193-B6AA-5C449C94519F}">
+  <ds:schemaRefs>
+    <ds:schemaRef ds:uri="http://schemas.microsoft.com/sharepoint/v3/contenttype/forms"/>
   </ds:schemaRefs>
 </ds:datastoreItem>
 </file>

</xml_diff>